<commit_message>
update date on presentation
</commit_message>
<xml_diff>
--- a/poison_cluster_defense.pptx
+++ b/poison_cluster_defense.pptx
@@ -6906,8 +6906,8 @@
               <a:t>Budapest, 2025.</a:t>
             </a:r>
             <a:r>
-              <a:rPr lang="en-US" dirty="0"/>
-              <a:t>05.07</a:t>
+              <a:rPr lang="en-US"/>
+              <a:t>05.06</a:t>
             </a:r>
             <a:endParaRPr lang="hu-HU" dirty="0"/>
           </a:p>

</xml_diff>

<commit_message>
update presentation and randomized injection documentation
</commit_message>
<xml_diff>
--- a/poison_cluster_defense.pptx
+++ b/poison_cluster_defense.pptx
@@ -5,17 +5,19 @@
     <p:sldMasterId id="2147483648" r:id="rId1"/>
   </p:sldMasterIdLst>
   <p:notesMasterIdLst>
-    <p:notesMasterId r:id="rId7"/>
+    <p:notesMasterId r:id="rId9"/>
   </p:notesMasterIdLst>
   <p:handoutMasterIdLst>
-    <p:handoutMasterId r:id="rId8"/>
+    <p:handoutMasterId r:id="rId10"/>
   </p:handoutMasterIdLst>
   <p:sldIdLst>
     <p:sldId id="272" r:id="rId2"/>
     <p:sldId id="295" r:id="rId3"/>
     <p:sldId id="299" r:id="rId4"/>
     <p:sldId id="302" r:id="rId5"/>
-    <p:sldId id="285" r:id="rId6"/>
+    <p:sldId id="304" r:id="rId6"/>
+    <p:sldId id="305" r:id="rId7"/>
+    <p:sldId id="285" r:id="rId8"/>
   </p:sldIdLst>
   <p:sldSz cx="12192000" cy="6858000"/>
   <p:notesSz cx="6858000" cy="9144000"/>
@@ -219,7 +221,7 @@
           <a:p>
             <a:fld id="{C8771E59-BB6D-9C41-A61C-2D524682E115}" type="datetimeFigureOut">
               <a:rPr lang="hu-HU" smtClean="0"/>
-              <a:t>2025. 05. 01.</a:t>
+              <a:t>2025. 05. 03.</a:t>
             </a:fld>
             <a:endParaRPr lang="hu-HU"/>
           </a:p>
@@ -396,7 +398,7 @@
           <a:p>
             <a:fld id="{B4DA393B-998D-3C45-ACA4-5C51E3A83922}" type="datetimeFigureOut">
               <a:rPr lang="hu-HU" smtClean="0"/>
-              <a:t>2025. 05. 01.</a:t>
+              <a:t>2025. 05. 03.</a:t>
             </a:fld>
             <a:endParaRPr lang="hu-HU"/>
           </a:p>
@@ -6784,7 +6786,7 @@
         </p:nvSpPr>
         <p:spPr>
           <a:xfrm>
-            <a:off x="723900" y="1956395"/>
+            <a:off x="723900" y="2131709"/>
             <a:ext cx="10744200" cy="1879880"/>
           </a:xfrm>
         </p:spPr>
@@ -6795,7 +6797,7 @@
             <a:pPr algn="ctr"/>
             <a:r>
               <a:rPr lang="en-US" dirty="0"/>
-              <a:t>Outlier Injection in K-means Clustering</a:t>
+              <a:t>Outlier Injection in K-Means Clustering</a:t>
             </a:r>
             <a:endParaRPr lang="hu-HU" dirty="0"/>
           </a:p>
@@ -7172,8 +7174,8 @@
         </p:nvSpPr>
         <p:spPr>
           <a:xfrm>
-            <a:off x="838200" y="1607437"/>
-            <a:ext cx="10515600" cy="4065776"/>
+            <a:off x="838200" y="1396111"/>
+            <a:ext cx="10515600" cy="4738574"/>
           </a:xfrm>
         </p:spPr>
         <p:txBody>
@@ -7213,11 +7215,67 @@
             </a:r>
           </a:p>
           <a:p>
+            <a:pPr lvl="2"/>
+            <a:r>
+              <a:rPr lang="en-US" dirty="0"/>
+              <a:t>Inserting data on cluster borders</a:t>
+            </a:r>
+          </a:p>
+          <a:p>
+            <a:pPr lvl="2"/>
+            <a:r>
+              <a:rPr lang="en-US" dirty="0"/>
+              <a:t>Mimicry based attack</a:t>
+            </a:r>
+          </a:p>
+          <a:p>
+            <a:pPr lvl="2"/>
+            <a:r>
+              <a:rPr lang="en-US" dirty="0"/>
+              <a:t>Semi-supervised model exploitation</a:t>
+            </a:r>
+          </a:p>
+          <a:p>
+            <a:pPr lvl="2"/>
+            <a:r>
+              <a:rPr lang="en-US" dirty="0"/>
+              <a:t>Classification for comparison</a:t>
+            </a:r>
+          </a:p>
+          <a:p>
             <a:pPr lvl="1"/>
+            <a:r>
+              <a:rPr lang="en-US" dirty="0"/>
+              <a:t>Randomized data</a:t>
+            </a:r>
+          </a:p>
+          <a:p>
+            <a:pPr lvl="2"/>
             <a:r>
               <a:rPr lang="en-US" dirty="0"/>
               <a:t>Random noise</a:t>
             </a:r>
+          </a:p>
+          <a:p>
+            <a:pPr lvl="2"/>
+            <a:r>
+              <a:rPr lang="en-US" dirty="0"/>
+              <a:t>Label shuffling</a:t>
+            </a:r>
+          </a:p>
+          <a:p>
+            <a:pPr lvl="2"/>
+            <a:r>
+              <a:rPr lang="en-US" dirty="0"/>
+              <a:t>Injecting subtle data</a:t>
+            </a:r>
+          </a:p>
+          <a:p>
+            <a:pPr lvl="1"/>
+            <a:endParaRPr lang="en-US" dirty="0"/>
+          </a:p>
+          <a:p>
+            <a:pPr lvl="1"/>
             <a:endParaRPr lang="en-HU" dirty="0"/>
           </a:p>
         </p:txBody>
@@ -7366,6 +7424,19 @@
           <a:p>
             <a:r>
               <a:rPr lang="en-HU" dirty="0"/>
+              <a:t>Anass</a:t>
+            </a:r>
+          </a:p>
+          <a:p>
+            <a:pPr lvl="1"/>
+            <a:r>
+              <a:rPr lang="en-HU" dirty="0"/>
+              <a:t>Comparing SVM classification to classification attacks</a:t>
+            </a:r>
+          </a:p>
+          <a:p>
+            <a:r>
+              <a:rPr lang="en-HU" dirty="0"/>
               <a:t>Levente</a:t>
             </a:r>
           </a:p>
@@ -7433,6 +7504,1562 @@
 </file>
 
 <file path=ppt/slides/slide5.xml><?xml version="1.0" encoding="utf-8"?>
+<p:sld xmlns:a="http://schemas.openxmlformats.org/drawingml/2006/main" xmlns:r="http://schemas.openxmlformats.org/officeDocument/2006/relationships" xmlns:p="http://schemas.openxmlformats.org/presentationml/2006/main">
+  <p:cSld>
+    <p:spTree>
+      <p:nvGrpSpPr>
+        <p:cNvPr id="1" name="">
+          <a:extLst>
+            <a:ext uri="{FF2B5EF4-FFF2-40B4-BE49-F238E27FC236}">
+              <a16:creationId xmlns:a16="http://schemas.microsoft.com/office/drawing/2014/main" id="{8ECB3D20-89FD-8CA3-F731-8FF166271566}"/>
+            </a:ext>
+          </a:extLst>
+        </p:cNvPr>
+        <p:cNvGrpSpPr/>
+        <p:nvPr/>
+      </p:nvGrpSpPr>
+      <p:grpSpPr>
+        <a:xfrm>
+          <a:off x="0" y="0"/>
+          <a:ext cx="0" cy="0"/>
+          <a:chOff x="0" y="0"/>
+          <a:chExt cx="0" cy="0"/>
+        </a:xfrm>
+      </p:grpSpPr>
+      <p:sp>
+        <p:nvSpPr>
+          <p:cNvPr id="2" name="Text Placeholder 1">
+            <a:extLst>
+              <a:ext uri="{FF2B5EF4-FFF2-40B4-BE49-F238E27FC236}">
+                <a16:creationId xmlns:a16="http://schemas.microsoft.com/office/drawing/2014/main" id="{4DD6EBFF-B5C8-0437-64D7-2BE80CA0108C}"/>
+              </a:ext>
+            </a:extLst>
+          </p:cNvPr>
+          <p:cNvSpPr>
+            <a:spLocks noGrp="1"/>
+          </p:cNvSpPr>
+          <p:nvPr>
+            <p:ph type="body" idx="16"/>
+          </p:nvPr>
+        </p:nvSpPr>
+        <p:spPr/>
+        <p:txBody>
+          <a:bodyPr/>
+          <a:lstStyle/>
+          <a:p>
+            <a:r>
+              <a:rPr lang="en-US" dirty="0"/>
+              <a:t>Randomized Injection</a:t>
+            </a:r>
+            <a:endParaRPr lang="en-HU" dirty="0"/>
+          </a:p>
+        </p:txBody>
+      </p:sp>
+      <p:sp>
+        <p:nvSpPr>
+          <p:cNvPr id="3" name="Text Placeholder 2">
+            <a:extLst>
+              <a:ext uri="{FF2B5EF4-FFF2-40B4-BE49-F238E27FC236}">
+                <a16:creationId xmlns:a16="http://schemas.microsoft.com/office/drawing/2014/main" id="{B7E0A035-FB43-71C4-9E84-E2E816659BB0}"/>
+              </a:ext>
+            </a:extLst>
+          </p:cNvPr>
+          <p:cNvSpPr>
+            <a:spLocks noGrp="1"/>
+          </p:cNvSpPr>
+          <p:nvPr>
+            <p:ph type="body" idx="17"/>
+          </p:nvPr>
+        </p:nvSpPr>
+        <p:spPr>
+          <a:xfrm>
+            <a:off x="838200" y="1607437"/>
+            <a:ext cx="10515600" cy="4065776"/>
+          </a:xfrm>
+        </p:spPr>
+        <p:txBody>
+          <a:bodyPr/>
+          <a:lstStyle/>
+          <a:p>
+            <a:r>
+              <a:rPr lang="en-GB" dirty="0"/>
+              <a:t>Gaussian Noise</a:t>
+            </a:r>
+          </a:p>
+          <a:p>
+            <a:r>
+              <a:rPr lang="en-GB" dirty="0"/>
+              <a:t>Uniform Outliers</a:t>
+            </a:r>
+            <a:endParaRPr lang="en-HU" dirty="0"/>
+          </a:p>
+          <a:p>
+            <a:r>
+              <a:rPr lang="en-GB" dirty="0"/>
+              <a:t>Subtle outliers</a:t>
+            </a:r>
+          </a:p>
+          <a:p>
+            <a:r>
+              <a:rPr lang="en-GB" dirty="0"/>
+              <a:t>Shuffled labels</a:t>
+            </a:r>
+            <a:endParaRPr lang="en-HU" dirty="0"/>
+          </a:p>
+        </p:txBody>
+      </p:sp>
+      <p:sp>
+        <p:nvSpPr>
+          <p:cNvPr id="6" name="Text Placeholder 5">
+            <a:extLst>
+              <a:ext uri="{FF2B5EF4-FFF2-40B4-BE49-F238E27FC236}">
+                <a16:creationId xmlns:a16="http://schemas.microsoft.com/office/drawing/2014/main" id="{A308B7B3-D4EA-41A4-E0A5-C87AD2E5A602}"/>
+              </a:ext>
+            </a:extLst>
+          </p:cNvPr>
+          <p:cNvSpPr>
+            <a:spLocks noGrp="1"/>
+          </p:cNvSpPr>
+          <p:nvPr>
+            <p:ph type="body" idx="20"/>
+          </p:nvPr>
+        </p:nvSpPr>
+        <p:spPr/>
+        <p:txBody>
+          <a:bodyPr/>
+          <a:lstStyle/>
+          <a:p>
+            <a:endParaRPr lang="en-HU"/>
+          </a:p>
+        </p:txBody>
+      </p:sp>
+      <p:pic>
+        <p:nvPicPr>
+          <p:cNvPr id="13" name="Picture 12">
+            <a:extLst>
+              <a:ext uri="{FF2B5EF4-FFF2-40B4-BE49-F238E27FC236}">
+                <a16:creationId xmlns:a16="http://schemas.microsoft.com/office/drawing/2014/main" id="{AE56749A-097B-5B11-A650-72C67FCAF0CB}"/>
+              </a:ext>
+            </a:extLst>
+          </p:cNvPr>
+          <p:cNvPicPr>
+            <a:picLocks noChangeAspect="1"/>
+          </p:cNvPicPr>
+          <p:nvPr/>
+        </p:nvPicPr>
+        <p:blipFill>
+          <a:blip r:embed="rId2"/>
+          <a:stretch>
+            <a:fillRect/>
+          </a:stretch>
+        </p:blipFill>
+        <p:spPr>
+          <a:xfrm>
+            <a:off x="4235384" y="2057400"/>
+            <a:ext cx="2429420" cy="2743200"/>
+          </a:xfrm>
+          <a:prstGeom prst="rect">
+            <a:avLst/>
+          </a:prstGeom>
+        </p:spPr>
+      </p:pic>
+      <p:grpSp>
+        <p:nvGrpSpPr>
+          <p:cNvPr id="15" name="Group 14">
+            <a:extLst>
+              <a:ext uri="{FF2B5EF4-FFF2-40B4-BE49-F238E27FC236}">
+                <a16:creationId xmlns:a16="http://schemas.microsoft.com/office/drawing/2014/main" id="{49251F54-8970-B1D6-AE09-622985AD84E6}"/>
+              </a:ext>
+            </a:extLst>
+          </p:cNvPr>
+          <p:cNvGrpSpPr/>
+          <p:nvPr/>
+        </p:nvGrpSpPr>
+        <p:grpSpPr>
+          <a:xfrm>
+            <a:off x="6918251" y="1329566"/>
+            <a:ext cx="3887203" cy="4469634"/>
+            <a:chOff x="6844530" y="1301861"/>
+            <a:chExt cx="3887203" cy="4469634"/>
+          </a:xfrm>
+        </p:grpSpPr>
+        <p:pic>
+          <p:nvPicPr>
+            <p:cNvPr id="7" name="Picture 6">
+              <a:extLst>
+                <a:ext uri="{FF2B5EF4-FFF2-40B4-BE49-F238E27FC236}">
+                  <a16:creationId xmlns:a16="http://schemas.microsoft.com/office/drawing/2014/main" id="{3126FBD5-7F80-662E-7147-1142E0807BA2}"/>
+                </a:ext>
+              </a:extLst>
+            </p:cNvPr>
+            <p:cNvPicPr>
+              <a:picLocks noChangeAspect="1"/>
+            </p:cNvPicPr>
+            <p:nvPr/>
+          </p:nvPicPr>
+          <p:blipFill>
+            <a:blip r:embed="rId3"/>
+            <a:stretch>
+              <a:fillRect/>
+            </a:stretch>
+          </p:blipFill>
+          <p:spPr>
+            <a:xfrm>
+              <a:off x="8809328" y="1309451"/>
+              <a:ext cx="1852339" cy="2169045"/>
+            </a:xfrm>
+            <a:prstGeom prst="rect">
+              <a:avLst/>
+            </a:prstGeom>
+          </p:spPr>
+        </p:pic>
+        <p:pic>
+          <p:nvPicPr>
+            <p:cNvPr id="8" name="Picture 7">
+              <a:extLst>
+                <a:ext uri="{FF2B5EF4-FFF2-40B4-BE49-F238E27FC236}">
+                  <a16:creationId xmlns:a16="http://schemas.microsoft.com/office/drawing/2014/main" id="{E1CE0712-4441-DB16-5A12-E9CD32BF9AAB}"/>
+                </a:ext>
+              </a:extLst>
+            </p:cNvPr>
+            <p:cNvPicPr>
+              <a:picLocks noChangeAspect="1"/>
+            </p:cNvPicPr>
+            <p:nvPr/>
+          </p:nvPicPr>
+          <p:blipFill>
+            <a:blip r:embed="rId4"/>
+            <a:stretch>
+              <a:fillRect/>
+            </a:stretch>
+          </p:blipFill>
+          <p:spPr>
+            <a:xfrm>
+              <a:off x="6908600" y="1301861"/>
+              <a:ext cx="1852338" cy="2169043"/>
+            </a:xfrm>
+            <a:prstGeom prst="rect">
+              <a:avLst/>
+            </a:prstGeom>
+          </p:spPr>
+        </p:pic>
+        <p:pic>
+          <p:nvPicPr>
+            <p:cNvPr id="10" name="Picture 9">
+              <a:extLst>
+                <a:ext uri="{FF2B5EF4-FFF2-40B4-BE49-F238E27FC236}">
+                  <a16:creationId xmlns:a16="http://schemas.microsoft.com/office/drawing/2014/main" id="{CF4041F0-EC0C-A230-6E2A-31C3036EA170}"/>
+                </a:ext>
+              </a:extLst>
+            </p:cNvPr>
+            <p:cNvPicPr>
+              <a:picLocks noChangeAspect="1"/>
+            </p:cNvPicPr>
+            <p:nvPr/>
+          </p:nvPicPr>
+          <p:blipFill>
+            <a:blip r:embed="rId5"/>
+            <a:stretch>
+              <a:fillRect/>
+            </a:stretch>
+          </p:blipFill>
+          <p:spPr>
+            <a:xfrm>
+              <a:off x="8767055" y="3470904"/>
+              <a:ext cx="1964678" cy="2300591"/>
+            </a:xfrm>
+            <a:prstGeom prst="rect">
+              <a:avLst/>
+            </a:prstGeom>
+          </p:spPr>
+        </p:pic>
+        <p:pic>
+          <p:nvPicPr>
+            <p:cNvPr id="14" name="Picture 13">
+              <a:extLst>
+                <a:ext uri="{FF2B5EF4-FFF2-40B4-BE49-F238E27FC236}">
+                  <a16:creationId xmlns:a16="http://schemas.microsoft.com/office/drawing/2014/main" id="{A49E3B6F-3AAC-44D6-F600-8B0FB4F62C66}"/>
+                </a:ext>
+              </a:extLst>
+            </p:cNvPr>
+            <p:cNvPicPr>
+              <a:picLocks noChangeAspect="1"/>
+            </p:cNvPicPr>
+            <p:nvPr/>
+          </p:nvPicPr>
+          <p:blipFill>
+            <a:blip r:embed="rId6"/>
+            <a:stretch>
+              <a:fillRect/>
+            </a:stretch>
+          </p:blipFill>
+          <p:spPr>
+            <a:xfrm>
+              <a:off x="6844530" y="3486089"/>
+              <a:ext cx="2023990" cy="2285406"/>
+            </a:xfrm>
+            <a:prstGeom prst="rect">
+              <a:avLst/>
+            </a:prstGeom>
+          </p:spPr>
+        </p:pic>
+      </p:grpSp>
+    </p:spTree>
+    <p:extLst>
+      <p:ext uri="{BB962C8B-B14F-4D97-AF65-F5344CB8AC3E}">
+        <p14:creationId xmlns:p14="http://schemas.microsoft.com/office/powerpoint/2010/main" val="3834798615"/>
+      </p:ext>
+    </p:extLst>
+  </p:cSld>
+  <p:clrMapOvr>
+    <a:masterClrMapping/>
+  </p:clrMapOvr>
+</p:sld>
+</file>
+
+<file path=ppt/slides/slide6.xml><?xml version="1.0" encoding="utf-8"?>
+<p:sld xmlns:a="http://schemas.openxmlformats.org/drawingml/2006/main" xmlns:r="http://schemas.openxmlformats.org/officeDocument/2006/relationships" xmlns:p="http://schemas.openxmlformats.org/presentationml/2006/main">
+  <p:cSld>
+    <p:spTree>
+      <p:nvGrpSpPr>
+        <p:cNvPr id="1" name="">
+          <a:extLst>
+            <a:ext uri="{FF2B5EF4-FFF2-40B4-BE49-F238E27FC236}">
+              <a16:creationId xmlns:a16="http://schemas.microsoft.com/office/drawing/2014/main" id="{21807B24-45D0-6049-B9CD-3616990EF035}"/>
+            </a:ext>
+          </a:extLst>
+        </p:cNvPr>
+        <p:cNvGrpSpPr/>
+        <p:nvPr/>
+      </p:nvGrpSpPr>
+      <p:grpSpPr>
+        <a:xfrm>
+          <a:off x="0" y="0"/>
+          <a:ext cx="0" cy="0"/>
+          <a:chOff x="0" y="0"/>
+          <a:chExt cx="0" cy="0"/>
+        </a:xfrm>
+      </p:grpSpPr>
+      <p:sp>
+        <p:nvSpPr>
+          <p:cNvPr id="2" name="Text Placeholder 1">
+            <a:extLst>
+              <a:ext uri="{FF2B5EF4-FFF2-40B4-BE49-F238E27FC236}">
+                <a16:creationId xmlns:a16="http://schemas.microsoft.com/office/drawing/2014/main" id="{C191EDFB-0B9D-59FC-819E-45D10E5328D5}"/>
+              </a:ext>
+            </a:extLst>
+          </p:cNvPr>
+          <p:cNvSpPr>
+            <a:spLocks noGrp="1"/>
+          </p:cNvSpPr>
+          <p:nvPr>
+            <p:ph type="body" idx="16"/>
+          </p:nvPr>
+        </p:nvSpPr>
+        <p:spPr/>
+        <p:txBody>
+          <a:bodyPr/>
+          <a:lstStyle/>
+          <a:p>
+            <a:r>
+              <a:rPr lang="en-US" dirty="0"/>
+              <a:t>Randomized Injection</a:t>
+            </a:r>
+            <a:endParaRPr lang="en-HU" dirty="0"/>
+          </a:p>
+        </p:txBody>
+      </p:sp>
+      <p:sp>
+        <p:nvSpPr>
+          <p:cNvPr id="6" name="Text Placeholder 5">
+            <a:extLst>
+              <a:ext uri="{FF2B5EF4-FFF2-40B4-BE49-F238E27FC236}">
+                <a16:creationId xmlns:a16="http://schemas.microsoft.com/office/drawing/2014/main" id="{0FB1C8C8-9C8A-D488-B868-F244DEA01E36}"/>
+              </a:ext>
+            </a:extLst>
+          </p:cNvPr>
+          <p:cNvSpPr>
+            <a:spLocks noGrp="1"/>
+          </p:cNvSpPr>
+          <p:nvPr>
+            <p:ph type="body" idx="20"/>
+          </p:nvPr>
+        </p:nvSpPr>
+        <p:spPr/>
+        <p:txBody>
+          <a:bodyPr/>
+          <a:lstStyle/>
+          <a:p>
+            <a:endParaRPr lang="en-HU"/>
+          </a:p>
+        </p:txBody>
+      </p:sp>
+      <p:graphicFrame>
+        <p:nvGraphicFramePr>
+          <p:cNvPr id="4" name="Table 3">
+            <a:extLst>
+              <a:ext uri="{FF2B5EF4-FFF2-40B4-BE49-F238E27FC236}">
+                <a16:creationId xmlns:a16="http://schemas.microsoft.com/office/drawing/2014/main" id="{7D9A8CD8-D5DC-E4AD-8714-246A79B9DE34}"/>
+              </a:ext>
+            </a:extLst>
+          </p:cNvPr>
+          <p:cNvGraphicFramePr>
+            <a:graphicFrameLocks noGrp="1"/>
+          </p:cNvGraphicFramePr>
+          <p:nvPr>
+            <p:extLst>
+              <p:ext uri="{D42A27DB-BD31-4B8C-83A1-F6EECF244321}">
+                <p14:modId xmlns:p14="http://schemas.microsoft.com/office/powerpoint/2010/main" val="2138934877"/>
+              </p:ext>
+            </p:extLst>
+          </p:nvPr>
+        </p:nvGraphicFramePr>
+        <p:xfrm>
+          <a:off x="838200" y="1830485"/>
+          <a:ext cx="10515600" cy="3480067"/>
+        </p:xfrm>
+        <a:graphic>
+          <a:graphicData uri="http://schemas.openxmlformats.org/drawingml/2006/table">
+            <a:tbl>
+              <a:tblPr/>
+              <a:tblGrid>
+                <a:gridCol w="808164">
+                  <a:extLst>
+                    <a:ext uri="{9D8B030D-6E8A-4147-A177-3AD203B41FA5}">
+                      <a16:colId xmlns:a16="http://schemas.microsoft.com/office/drawing/2014/main" val="3580539963"/>
+                    </a:ext>
+                  </a:extLst>
+                </a:gridCol>
+                <a:gridCol w="3398076">
+                  <a:extLst>
+                    <a:ext uri="{9D8B030D-6E8A-4147-A177-3AD203B41FA5}">
+                      <a16:colId xmlns:a16="http://schemas.microsoft.com/office/drawing/2014/main" val="1752262900"/>
+                    </a:ext>
+                  </a:extLst>
+                </a:gridCol>
+                <a:gridCol w="2103120">
+                  <a:extLst>
+                    <a:ext uri="{9D8B030D-6E8A-4147-A177-3AD203B41FA5}">
+                      <a16:colId xmlns:a16="http://schemas.microsoft.com/office/drawing/2014/main" val="808131755"/>
+                    </a:ext>
+                  </a:extLst>
+                </a:gridCol>
+                <a:gridCol w="2103120">
+                  <a:extLst>
+                    <a:ext uri="{9D8B030D-6E8A-4147-A177-3AD203B41FA5}">
+                      <a16:colId xmlns:a16="http://schemas.microsoft.com/office/drawing/2014/main" val="641345387"/>
+                    </a:ext>
+                  </a:extLst>
+                </a:gridCol>
+                <a:gridCol w="2103120">
+                  <a:extLst>
+                    <a:ext uri="{9D8B030D-6E8A-4147-A177-3AD203B41FA5}">
+                      <a16:colId xmlns:a16="http://schemas.microsoft.com/office/drawing/2014/main" val="1528192510"/>
+                    </a:ext>
+                  </a:extLst>
+                </a:gridCol>
+              </a:tblGrid>
+              <a:tr h="770340">
+                <a:tc>
+                  <a:txBody>
+                    <a:bodyPr/>
+                    <a:lstStyle/>
+                    <a:p>
+                      <a:pPr algn="l"/>
+                      <a:br>
+                        <a:rPr lang="en-GB" sz="1600" b="1" dirty="0">
+                          <a:effectLst/>
+                        </a:rPr>
+                      </a:br>
+                      <a:endParaRPr lang="en-GB" sz="1600" b="1" dirty="0">
+                        <a:effectLst/>
+                      </a:endParaRPr>
+                    </a:p>
+                  </a:txBody>
+                  <a:tcPr anchor="ctr">
+                    <a:lnL w="12700" cap="flat" cmpd="sng" algn="ctr">
+                      <a:solidFill>
+                        <a:schemeClr val="tx1"/>
+                      </a:solidFill>
+                      <a:prstDash val="solid"/>
+                      <a:round/>
+                      <a:headEnd type="none" w="med" len="med"/>
+                      <a:tailEnd type="none" w="med" len="med"/>
+                    </a:lnL>
+                    <a:lnR w="12700" cap="flat" cmpd="sng" algn="ctr">
+                      <a:solidFill>
+                        <a:schemeClr val="tx1"/>
+                      </a:solidFill>
+                      <a:prstDash val="solid"/>
+                      <a:round/>
+                      <a:headEnd type="none" w="med" len="med"/>
+                      <a:tailEnd type="none" w="med" len="med"/>
+                    </a:lnR>
+                    <a:lnT w="12700" cap="flat" cmpd="sng" algn="ctr">
+                      <a:solidFill>
+                        <a:schemeClr val="tx1"/>
+                      </a:solidFill>
+                      <a:prstDash val="solid"/>
+                      <a:round/>
+                      <a:headEnd type="none" w="med" len="med"/>
+                      <a:tailEnd type="none" w="med" len="med"/>
+                    </a:lnT>
+                    <a:lnB w="12700" cap="flat" cmpd="sng" algn="ctr">
+                      <a:solidFill>
+                        <a:schemeClr val="tx1"/>
+                      </a:solidFill>
+                      <a:prstDash val="solid"/>
+                      <a:round/>
+                      <a:headEnd type="none" w="med" len="med"/>
+                      <a:tailEnd type="none" w="med" len="med"/>
+                    </a:lnB>
+                    <a:lnTlToBr w="12700" cmpd="sng">
+                      <a:noFill/>
+                      <a:prstDash val="solid"/>
+                    </a:lnTlToBr>
+                    <a:lnBlToTr w="12700" cmpd="sng">
+                      <a:noFill/>
+                      <a:prstDash val="solid"/>
+                    </a:lnBlToTr>
+                    <a:noFill/>
+                  </a:tcPr>
+                </a:tc>
+                <a:tc>
+                  <a:txBody>
+                    <a:bodyPr/>
+                    <a:lstStyle/>
+                    <a:p>
+                      <a:pPr algn="l"/>
+                      <a:r>
+                        <a:rPr lang="en-GB" sz="1600" b="1" dirty="0">
+                          <a:effectLst/>
+                        </a:rPr>
+                        <a:t>Noisy</a:t>
+                      </a:r>
+                    </a:p>
+                  </a:txBody>
+                  <a:tcPr anchor="ctr">
+                    <a:lnL w="12700" cap="flat" cmpd="sng" algn="ctr">
+                      <a:solidFill>
+                        <a:schemeClr val="tx1"/>
+                      </a:solidFill>
+                      <a:prstDash val="solid"/>
+                      <a:round/>
+                      <a:headEnd type="none" w="med" len="med"/>
+                      <a:tailEnd type="none" w="med" len="med"/>
+                    </a:lnL>
+                    <a:lnR w="12700" cap="flat" cmpd="sng" algn="ctr">
+                      <a:solidFill>
+                        <a:schemeClr val="tx1"/>
+                      </a:solidFill>
+                      <a:prstDash val="solid"/>
+                      <a:round/>
+                      <a:headEnd type="none" w="med" len="med"/>
+                      <a:tailEnd type="none" w="med" len="med"/>
+                    </a:lnR>
+                    <a:lnT w="12700" cap="flat" cmpd="sng" algn="ctr">
+                      <a:solidFill>
+                        <a:schemeClr val="tx1"/>
+                      </a:solidFill>
+                      <a:prstDash val="solid"/>
+                      <a:round/>
+                      <a:headEnd type="none" w="med" len="med"/>
+                      <a:tailEnd type="none" w="med" len="med"/>
+                    </a:lnT>
+                    <a:lnB w="12700" cap="flat" cmpd="sng" algn="ctr">
+                      <a:solidFill>
+                        <a:schemeClr val="tx1"/>
+                      </a:solidFill>
+                      <a:prstDash val="solid"/>
+                      <a:round/>
+                      <a:headEnd type="none" w="med" len="med"/>
+                      <a:tailEnd type="none" w="med" len="med"/>
+                    </a:lnB>
+                    <a:lnTlToBr w="12700" cmpd="sng">
+                      <a:noFill/>
+                      <a:prstDash val="solid"/>
+                    </a:lnTlToBr>
+                    <a:lnBlToTr w="12700" cmpd="sng">
+                      <a:noFill/>
+                      <a:prstDash val="solid"/>
+                    </a:lnBlToTr>
+                    <a:noFill/>
+                  </a:tcPr>
+                </a:tc>
+                <a:tc>
+                  <a:txBody>
+                    <a:bodyPr/>
+                    <a:lstStyle/>
+                    <a:p>
+                      <a:pPr algn="l"/>
+                      <a:r>
+                        <a:rPr lang="en-GB" sz="1600" b="1" dirty="0">
+                          <a:effectLst/>
+                        </a:rPr>
+                        <a:t>Uniform</a:t>
+                      </a:r>
+                    </a:p>
+                  </a:txBody>
+                  <a:tcPr anchor="ctr">
+                    <a:lnL w="12700" cap="flat" cmpd="sng" algn="ctr">
+                      <a:solidFill>
+                        <a:schemeClr val="tx1"/>
+                      </a:solidFill>
+                      <a:prstDash val="solid"/>
+                      <a:round/>
+                      <a:headEnd type="none" w="med" len="med"/>
+                      <a:tailEnd type="none" w="med" len="med"/>
+                    </a:lnL>
+                    <a:lnR w="12700" cap="flat" cmpd="sng" algn="ctr">
+                      <a:solidFill>
+                        <a:schemeClr val="tx1"/>
+                      </a:solidFill>
+                      <a:prstDash val="solid"/>
+                      <a:round/>
+                      <a:headEnd type="none" w="med" len="med"/>
+                      <a:tailEnd type="none" w="med" len="med"/>
+                    </a:lnR>
+                    <a:lnT w="12700" cap="flat" cmpd="sng" algn="ctr">
+                      <a:solidFill>
+                        <a:schemeClr val="tx1"/>
+                      </a:solidFill>
+                      <a:prstDash val="solid"/>
+                      <a:round/>
+                      <a:headEnd type="none" w="med" len="med"/>
+                      <a:tailEnd type="none" w="med" len="med"/>
+                    </a:lnT>
+                    <a:lnB w="12700" cap="flat" cmpd="sng" algn="ctr">
+                      <a:solidFill>
+                        <a:schemeClr val="tx1"/>
+                      </a:solidFill>
+                      <a:prstDash val="solid"/>
+                      <a:round/>
+                      <a:headEnd type="none" w="med" len="med"/>
+                      <a:tailEnd type="none" w="med" len="med"/>
+                    </a:lnB>
+                    <a:lnTlToBr w="12700" cmpd="sng">
+                      <a:noFill/>
+                      <a:prstDash val="solid"/>
+                    </a:lnTlToBr>
+                    <a:lnBlToTr w="12700" cmpd="sng">
+                      <a:noFill/>
+                      <a:prstDash val="solid"/>
+                    </a:lnBlToTr>
+                    <a:noFill/>
+                  </a:tcPr>
+                </a:tc>
+                <a:tc>
+                  <a:txBody>
+                    <a:bodyPr/>
+                    <a:lstStyle/>
+                    <a:p>
+                      <a:pPr algn="l"/>
+                      <a:r>
+                        <a:rPr lang="en-GB" sz="1600" b="1" dirty="0">
+                          <a:effectLst/>
+                        </a:rPr>
+                        <a:t>Subtle</a:t>
+                      </a:r>
+                    </a:p>
+                  </a:txBody>
+                  <a:tcPr anchor="ctr">
+                    <a:lnL w="12700" cap="flat" cmpd="sng" algn="ctr">
+                      <a:solidFill>
+                        <a:schemeClr val="tx1"/>
+                      </a:solidFill>
+                      <a:prstDash val="solid"/>
+                      <a:round/>
+                      <a:headEnd type="none" w="med" len="med"/>
+                      <a:tailEnd type="none" w="med" len="med"/>
+                    </a:lnL>
+                    <a:lnR w="12700" cap="flat" cmpd="sng" algn="ctr">
+                      <a:solidFill>
+                        <a:schemeClr val="tx1"/>
+                      </a:solidFill>
+                      <a:prstDash val="solid"/>
+                      <a:round/>
+                      <a:headEnd type="none" w="med" len="med"/>
+                      <a:tailEnd type="none" w="med" len="med"/>
+                    </a:lnR>
+                    <a:lnT w="12700" cap="flat" cmpd="sng" algn="ctr">
+                      <a:solidFill>
+                        <a:schemeClr val="tx1"/>
+                      </a:solidFill>
+                      <a:prstDash val="solid"/>
+                      <a:round/>
+                      <a:headEnd type="none" w="med" len="med"/>
+                      <a:tailEnd type="none" w="med" len="med"/>
+                    </a:lnT>
+                    <a:lnB w="12700" cap="flat" cmpd="sng" algn="ctr">
+                      <a:solidFill>
+                        <a:schemeClr val="tx1"/>
+                      </a:solidFill>
+                      <a:prstDash val="solid"/>
+                      <a:round/>
+                      <a:headEnd type="none" w="med" len="med"/>
+                      <a:tailEnd type="none" w="med" len="med"/>
+                    </a:lnB>
+                    <a:lnTlToBr w="12700" cmpd="sng">
+                      <a:noFill/>
+                      <a:prstDash val="solid"/>
+                    </a:lnTlToBr>
+                    <a:lnBlToTr w="12700" cmpd="sng">
+                      <a:noFill/>
+                      <a:prstDash val="solid"/>
+                    </a:lnBlToTr>
+                    <a:noFill/>
+                  </a:tcPr>
+                </a:tc>
+                <a:tc>
+                  <a:txBody>
+                    <a:bodyPr/>
+                    <a:lstStyle/>
+                    <a:p>
+                      <a:pPr algn="l"/>
+                      <a:r>
+                        <a:rPr lang="en-GB" sz="1600" b="1" dirty="0">
+                          <a:effectLst/>
+                        </a:rPr>
+                        <a:t>Shuffled</a:t>
+                      </a:r>
+                      <a:endParaRPr lang="en-HU" sz="1600" dirty="0"/>
+                    </a:p>
+                  </a:txBody>
+                  <a:tcPr anchor="ctr">
+                    <a:lnL w="12700" cap="flat" cmpd="sng" algn="ctr">
+                      <a:solidFill>
+                        <a:schemeClr val="tx1"/>
+                      </a:solidFill>
+                      <a:prstDash val="solid"/>
+                      <a:round/>
+                      <a:headEnd type="none" w="med" len="med"/>
+                      <a:tailEnd type="none" w="med" len="med"/>
+                    </a:lnL>
+                    <a:lnR w="12700" cap="flat" cmpd="sng" algn="ctr">
+                      <a:solidFill>
+                        <a:schemeClr val="tx1"/>
+                      </a:solidFill>
+                      <a:prstDash val="solid"/>
+                      <a:round/>
+                      <a:headEnd type="none" w="med" len="med"/>
+                      <a:tailEnd type="none" w="med" len="med"/>
+                    </a:lnR>
+                    <a:lnT w="12700" cap="flat" cmpd="sng" algn="ctr">
+                      <a:solidFill>
+                        <a:schemeClr val="tx1"/>
+                      </a:solidFill>
+                      <a:prstDash val="solid"/>
+                      <a:round/>
+                      <a:headEnd type="none" w="med" len="med"/>
+                      <a:tailEnd type="none" w="med" len="med"/>
+                    </a:lnT>
+                    <a:lnB w="12700" cap="flat" cmpd="sng" algn="ctr">
+                      <a:solidFill>
+                        <a:schemeClr val="tx1"/>
+                      </a:solidFill>
+                      <a:prstDash val="solid"/>
+                      <a:round/>
+                      <a:headEnd type="none" w="med" len="med"/>
+                      <a:tailEnd type="none" w="med" len="med"/>
+                    </a:lnB>
+                    <a:lnTlToBr w="12700" cmpd="sng">
+                      <a:noFill/>
+                      <a:prstDash val="solid"/>
+                    </a:lnTlToBr>
+                    <a:lnBlToTr w="12700" cmpd="sng">
+                      <a:noFill/>
+                      <a:prstDash val="solid"/>
+                    </a:lnBlToTr>
+                  </a:tcPr>
+                </a:tc>
+                <a:extLst>
+                  <a:ext uri="{0D108BD9-81ED-4DB2-BD59-A6C34878D82A}">
+                    <a16:rowId xmlns:a16="http://schemas.microsoft.com/office/drawing/2014/main" val="4209961453"/>
+                  </a:ext>
+                </a:extLst>
+              </a:tr>
+              <a:tr h="1760776">
+                <a:tc>
+                  <a:txBody>
+                    <a:bodyPr/>
+                    <a:lstStyle/>
+                    <a:p>
+                      <a:pPr algn="l" fontAlgn="ctr"/>
+                      <a:r>
+                        <a:rPr lang="en-GB" sz="1600" b="1" dirty="0">
+                          <a:effectLst/>
+                        </a:rPr>
+                        <a:t>Pros</a:t>
+                      </a:r>
+                    </a:p>
+                  </a:txBody>
+                  <a:tcPr anchor="ctr">
+                    <a:lnL w="12700" cap="flat" cmpd="sng" algn="ctr">
+                      <a:solidFill>
+                        <a:schemeClr val="tx1"/>
+                      </a:solidFill>
+                      <a:prstDash val="solid"/>
+                      <a:round/>
+                      <a:headEnd type="none" w="med" len="med"/>
+                      <a:tailEnd type="none" w="med" len="med"/>
+                    </a:lnL>
+                    <a:lnR w="12700" cap="flat" cmpd="sng" algn="ctr">
+                      <a:solidFill>
+                        <a:schemeClr val="tx1"/>
+                      </a:solidFill>
+                      <a:prstDash val="solid"/>
+                      <a:round/>
+                      <a:headEnd type="none" w="med" len="med"/>
+                      <a:tailEnd type="none" w="med" len="med"/>
+                    </a:lnR>
+                    <a:lnT w="12700" cap="flat" cmpd="sng" algn="ctr">
+                      <a:solidFill>
+                        <a:schemeClr val="tx1"/>
+                      </a:solidFill>
+                      <a:prstDash val="solid"/>
+                      <a:round/>
+                      <a:headEnd type="none" w="med" len="med"/>
+                      <a:tailEnd type="none" w="med" len="med"/>
+                    </a:lnT>
+                    <a:lnB w="12700" cap="flat" cmpd="sng" algn="ctr">
+                      <a:solidFill>
+                        <a:schemeClr val="tx1"/>
+                      </a:solidFill>
+                      <a:prstDash val="solid"/>
+                      <a:round/>
+                      <a:headEnd type="none" w="med" len="med"/>
+                      <a:tailEnd type="none" w="med" len="med"/>
+                    </a:lnB>
+                    <a:lnTlToBr w="12700" cmpd="sng">
+                      <a:noFill/>
+                      <a:prstDash val="solid"/>
+                    </a:lnTlToBr>
+                    <a:lnBlToTr w="12700" cmpd="sng">
+                      <a:noFill/>
+                      <a:prstDash val="solid"/>
+                    </a:lnBlToTr>
+                    <a:noFill/>
+                  </a:tcPr>
+                </a:tc>
+                <a:tc>
+                  <a:txBody>
+                    <a:bodyPr/>
+                    <a:lstStyle/>
+                    <a:p>
+                      <a:pPr marL="0" indent="0" algn="l">
+                        <a:buFontTx/>
+                        <a:buNone/>
+                      </a:pPr>
+                      <a:r>
+                        <a:rPr lang="en-GB" sz="1600" dirty="0">
+                          <a:effectLst/>
+                        </a:rPr>
+                        <a:t>M</a:t>
+                      </a:r>
+                      <a:r>
+                        <a:rPr lang="en-HU" sz="1600" dirty="0">
+                          <a:effectLst/>
+                        </a:rPr>
+                        <a:t>akes clusters fuzzy</a:t>
+                      </a:r>
+                    </a:p>
+                    <a:p>
+                      <a:pPr marL="0" indent="0" algn="l">
+                        <a:buFontTx/>
+                        <a:buNone/>
+                      </a:pPr>
+                      <a:r>
+                        <a:rPr lang="en-HU" sz="1600" dirty="0">
+                          <a:effectLst/>
+                        </a:rPr>
+                        <a:t>Reduces cluster boundaries</a:t>
+                      </a:r>
+                    </a:p>
+                  </a:txBody>
+                  <a:tcPr anchor="ctr">
+                    <a:lnL w="12700" cap="flat" cmpd="sng" algn="ctr">
+                      <a:solidFill>
+                        <a:schemeClr val="tx1"/>
+                      </a:solidFill>
+                      <a:prstDash val="solid"/>
+                      <a:round/>
+                      <a:headEnd type="none" w="med" len="med"/>
+                      <a:tailEnd type="none" w="med" len="med"/>
+                    </a:lnL>
+                    <a:lnR w="12700" cap="flat" cmpd="sng" algn="ctr">
+                      <a:solidFill>
+                        <a:schemeClr val="tx1"/>
+                      </a:solidFill>
+                      <a:prstDash val="solid"/>
+                      <a:round/>
+                      <a:headEnd type="none" w="med" len="med"/>
+                      <a:tailEnd type="none" w="med" len="med"/>
+                    </a:lnR>
+                    <a:lnT w="12700" cap="flat" cmpd="sng" algn="ctr">
+                      <a:solidFill>
+                        <a:schemeClr val="tx1"/>
+                      </a:solidFill>
+                      <a:prstDash val="solid"/>
+                      <a:round/>
+                      <a:headEnd type="none" w="med" len="med"/>
+                      <a:tailEnd type="none" w="med" len="med"/>
+                    </a:lnT>
+                    <a:lnB w="12700" cap="flat" cmpd="sng" algn="ctr">
+                      <a:solidFill>
+                        <a:schemeClr val="tx1"/>
+                      </a:solidFill>
+                      <a:prstDash val="solid"/>
+                      <a:round/>
+                      <a:headEnd type="none" w="med" len="med"/>
+                      <a:tailEnd type="none" w="med" len="med"/>
+                    </a:lnB>
+                    <a:lnTlToBr w="12700" cmpd="sng">
+                      <a:noFill/>
+                      <a:prstDash val="solid"/>
+                    </a:lnTlToBr>
+                    <a:lnBlToTr w="12700" cmpd="sng">
+                      <a:noFill/>
+                      <a:prstDash val="solid"/>
+                    </a:lnBlToTr>
+                    <a:noFill/>
+                  </a:tcPr>
+                </a:tc>
+                <a:tc>
+                  <a:txBody>
+                    <a:bodyPr/>
+                    <a:lstStyle/>
+                    <a:p>
+                      <a:pPr algn="l"/>
+                      <a:r>
+                        <a:rPr lang="en-HU" sz="1600" dirty="0">
+                          <a:effectLst/>
+                        </a:rPr>
+                        <a:t>Creates extreme values</a:t>
+                      </a:r>
+                    </a:p>
+                  </a:txBody>
+                  <a:tcPr anchor="ctr">
+                    <a:lnL w="12700" cap="flat" cmpd="sng" algn="ctr">
+                      <a:solidFill>
+                        <a:schemeClr val="tx1"/>
+                      </a:solidFill>
+                      <a:prstDash val="solid"/>
+                      <a:round/>
+                      <a:headEnd type="none" w="med" len="med"/>
+                      <a:tailEnd type="none" w="med" len="med"/>
+                    </a:lnL>
+                    <a:lnR w="12700" cap="flat" cmpd="sng" algn="ctr">
+                      <a:solidFill>
+                        <a:schemeClr val="tx1"/>
+                      </a:solidFill>
+                      <a:prstDash val="solid"/>
+                      <a:round/>
+                      <a:headEnd type="none" w="med" len="med"/>
+                      <a:tailEnd type="none" w="med" len="med"/>
+                    </a:lnR>
+                    <a:lnT w="12700" cap="flat" cmpd="sng" algn="ctr">
+                      <a:solidFill>
+                        <a:schemeClr val="tx1"/>
+                      </a:solidFill>
+                      <a:prstDash val="solid"/>
+                      <a:round/>
+                      <a:headEnd type="none" w="med" len="med"/>
+                      <a:tailEnd type="none" w="med" len="med"/>
+                    </a:lnT>
+                    <a:lnB w="12700" cap="flat" cmpd="sng" algn="ctr">
+                      <a:solidFill>
+                        <a:schemeClr val="tx1"/>
+                      </a:solidFill>
+                      <a:prstDash val="solid"/>
+                      <a:round/>
+                      <a:headEnd type="none" w="med" len="med"/>
+                      <a:tailEnd type="none" w="med" len="med"/>
+                    </a:lnB>
+                    <a:lnTlToBr w="12700" cmpd="sng">
+                      <a:noFill/>
+                      <a:prstDash val="solid"/>
+                    </a:lnTlToBr>
+                    <a:lnBlToTr w="12700" cmpd="sng">
+                      <a:noFill/>
+                      <a:prstDash val="solid"/>
+                    </a:lnBlToTr>
+                    <a:noFill/>
+                  </a:tcPr>
+                </a:tc>
+                <a:tc>
+                  <a:txBody>
+                    <a:bodyPr/>
+                    <a:lstStyle/>
+                    <a:p>
+                      <a:pPr marL="0" indent="0" algn="l">
+                        <a:buFontTx/>
+                        <a:buNone/>
+                      </a:pPr>
+                      <a:r>
+                        <a:rPr lang="en-HU" sz="1600" dirty="0">
+                          <a:effectLst/>
+                        </a:rPr>
+                        <a:t>Hard to detect</a:t>
+                      </a:r>
+                    </a:p>
+                  </a:txBody>
+                  <a:tcPr anchor="ctr">
+                    <a:lnL w="12700" cap="flat" cmpd="sng" algn="ctr">
+                      <a:solidFill>
+                        <a:schemeClr val="tx1"/>
+                      </a:solidFill>
+                      <a:prstDash val="solid"/>
+                      <a:round/>
+                      <a:headEnd type="none" w="med" len="med"/>
+                      <a:tailEnd type="none" w="med" len="med"/>
+                    </a:lnL>
+                    <a:lnR w="12700" cap="flat" cmpd="sng" algn="ctr">
+                      <a:solidFill>
+                        <a:schemeClr val="tx1"/>
+                      </a:solidFill>
+                      <a:prstDash val="solid"/>
+                      <a:round/>
+                      <a:headEnd type="none" w="med" len="med"/>
+                      <a:tailEnd type="none" w="med" len="med"/>
+                    </a:lnR>
+                    <a:lnT w="12700" cap="flat" cmpd="sng" algn="ctr">
+                      <a:solidFill>
+                        <a:schemeClr val="tx1"/>
+                      </a:solidFill>
+                      <a:prstDash val="solid"/>
+                      <a:round/>
+                      <a:headEnd type="none" w="med" len="med"/>
+                      <a:tailEnd type="none" w="med" len="med"/>
+                    </a:lnT>
+                    <a:lnB w="12700" cap="flat" cmpd="sng" algn="ctr">
+                      <a:solidFill>
+                        <a:schemeClr val="tx1"/>
+                      </a:solidFill>
+                      <a:prstDash val="solid"/>
+                      <a:round/>
+                      <a:headEnd type="none" w="med" len="med"/>
+                      <a:tailEnd type="none" w="med" len="med"/>
+                    </a:lnB>
+                    <a:lnTlToBr w="12700" cmpd="sng">
+                      <a:noFill/>
+                      <a:prstDash val="solid"/>
+                    </a:lnTlToBr>
+                    <a:lnBlToTr w="12700" cmpd="sng">
+                      <a:noFill/>
+                      <a:prstDash val="solid"/>
+                    </a:lnBlToTr>
+                    <a:noFill/>
+                  </a:tcPr>
+                </a:tc>
+                <a:tc>
+                  <a:txBody>
+                    <a:bodyPr/>
+                    <a:lstStyle/>
+                    <a:p>
+                      <a:pPr algn="l"/>
+                      <a:r>
+                        <a:rPr lang="en-HU" sz="1600" dirty="0">
+                          <a:effectLst/>
+                        </a:rPr>
+                        <a:t>Greatly disturbs the data</a:t>
+                      </a:r>
+                    </a:p>
+                  </a:txBody>
+                  <a:tcPr anchor="ctr">
+                    <a:lnL w="12700" cap="flat" cmpd="sng" algn="ctr">
+                      <a:solidFill>
+                        <a:schemeClr val="tx1"/>
+                      </a:solidFill>
+                      <a:prstDash val="solid"/>
+                      <a:round/>
+                      <a:headEnd type="none" w="med" len="med"/>
+                      <a:tailEnd type="none" w="med" len="med"/>
+                    </a:lnL>
+                    <a:lnR w="12700" cap="flat" cmpd="sng" algn="ctr">
+                      <a:solidFill>
+                        <a:schemeClr val="tx1"/>
+                      </a:solidFill>
+                      <a:prstDash val="solid"/>
+                      <a:round/>
+                      <a:headEnd type="none" w="med" len="med"/>
+                      <a:tailEnd type="none" w="med" len="med"/>
+                    </a:lnR>
+                    <a:lnT w="12700" cap="flat" cmpd="sng" algn="ctr">
+                      <a:solidFill>
+                        <a:schemeClr val="tx1"/>
+                      </a:solidFill>
+                      <a:prstDash val="solid"/>
+                      <a:round/>
+                      <a:headEnd type="none" w="med" len="med"/>
+                      <a:tailEnd type="none" w="med" len="med"/>
+                    </a:lnT>
+                    <a:lnB w="12700" cap="flat" cmpd="sng" algn="ctr">
+                      <a:solidFill>
+                        <a:schemeClr val="tx1"/>
+                      </a:solidFill>
+                      <a:prstDash val="solid"/>
+                      <a:round/>
+                      <a:headEnd type="none" w="med" len="med"/>
+                      <a:tailEnd type="none" w="med" len="med"/>
+                    </a:lnB>
+                    <a:lnTlToBr w="12700" cmpd="sng">
+                      <a:noFill/>
+                      <a:prstDash val="solid"/>
+                    </a:lnTlToBr>
+                    <a:lnBlToTr w="12700" cmpd="sng">
+                      <a:noFill/>
+                      <a:prstDash val="solid"/>
+                    </a:lnBlToTr>
+                    <a:noFill/>
+                  </a:tcPr>
+                </a:tc>
+                <a:extLst>
+                  <a:ext uri="{0D108BD9-81ED-4DB2-BD59-A6C34878D82A}">
+                    <a16:rowId xmlns:a16="http://schemas.microsoft.com/office/drawing/2014/main" val="3828876444"/>
+                  </a:ext>
+                </a:extLst>
+              </a:tr>
+              <a:tr h="948951">
+                <a:tc>
+                  <a:txBody>
+                    <a:bodyPr/>
+                    <a:lstStyle/>
+                    <a:p>
+                      <a:pPr algn="l" fontAlgn="ctr"/>
+                      <a:r>
+                        <a:rPr lang="en-GB" sz="1600" b="1" dirty="0">
+                          <a:effectLst/>
+                        </a:rPr>
+                        <a:t>Cons</a:t>
+                      </a:r>
+                    </a:p>
+                  </a:txBody>
+                  <a:tcPr anchor="ctr">
+                    <a:lnL w="12700" cap="flat" cmpd="sng" algn="ctr">
+                      <a:solidFill>
+                        <a:schemeClr val="tx1"/>
+                      </a:solidFill>
+                      <a:prstDash val="solid"/>
+                      <a:round/>
+                      <a:headEnd type="none" w="med" len="med"/>
+                      <a:tailEnd type="none" w="med" len="med"/>
+                    </a:lnL>
+                    <a:lnR w="12700" cap="flat" cmpd="sng" algn="ctr">
+                      <a:solidFill>
+                        <a:schemeClr val="tx1"/>
+                      </a:solidFill>
+                      <a:prstDash val="solid"/>
+                      <a:round/>
+                      <a:headEnd type="none" w="med" len="med"/>
+                      <a:tailEnd type="none" w="med" len="med"/>
+                    </a:lnR>
+                    <a:lnT w="12700" cap="flat" cmpd="sng" algn="ctr">
+                      <a:solidFill>
+                        <a:schemeClr val="tx1"/>
+                      </a:solidFill>
+                      <a:prstDash val="solid"/>
+                      <a:round/>
+                      <a:headEnd type="none" w="med" len="med"/>
+                      <a:tailEnd type="none" w="med" len="med"/>
+                    </a:lnT>
+                    <a:lnB w="12700" cap="flat" cmpd="sng" algn="ctr">
+                      <a:solidFill>
+                        <a:schemeClr val="tx1"/>
+                      </a:solidFill>
+                      <a:prstDash val="solid"/>
+                      <a:round/>
+                      <a:headEnd type="none" w="med" len="med"/>
+                      <a:tailEnd type="none" w="med" len="med"/>
+                    </a:lnB>
+                    <a:lnTlToBr w="12700" cmpd="sng">
+                      <a:noFill/>
+                      <a:prstDash val="solid"/>
+                    </a:lnTlToBr>
+                    <a:lnBlToTr w="12700" cmpd="sng">
+                      <a:noFill/>
+                      <a:prstDash val="solid"/>
+                    </a:lnBlToTr>
+                    <a:noFill/>
+                  </a:tcPr>
+                </a:tc>
+                <a:tc>
+                  <a:txBody>
+                    <a:bodyPr/>
+                    <a:lstStyle/>
+                    <a:p>
+                      <a:pPr algn="l"/>
+                      <a:r>
+                        <a:rPr lang="en-HU" sz="1600" dirty="0">
+                          <a:effectLst/>
+                        </a:rPr>
+                        <a:t>Varied success due to randomization</a:t>
+                      </a:r>
+                    </a:p>
+                  </a:txBody>
+                  <a:tcPr anchor="ctr">
+                    <a:lnL w="12700" cap="flat" cmpd="sng" algn="ctr">
+                      <a:solidFill>
+                        <a:schemeClr val="tx1"/>
+                      </a:solidFill>
+                      <a:prstDash val="solid"/>
+                      <a:round/>
+                      <a:headEnd type="none" w="med" len="med"/>
+                      <a:tailEnd type="none" w="med" len="med"/>
+                    </a:lnL>
+                    <a:lnR w="12700" cap="flat" cmpd="sng" algn="ctr">
+                      <a:solidFill>
+                        <a:schemeClr val="tx1"/>
+                      </a:solidFill>
+                      <a:prstDash val="solid"/>
+                      <a:round/>
+                      <a:headEnd type="none" w="med" len="med"/>
+                      <a:tailEnd type="none" w="med" len="med"/>
+                    </a:lnR>
+                    <a:lnT w="12700" cap="flat" cmpd="sng" algn="ctr">
+                      <a:solidFill>
+                        <a:schemeClr val="tx1"/>
+                      </a:solidFill>
+                      <a:prstDash val="solid"/>
+                      <a:round/>
+                      <a:headEnd type="none" w="med" len="med"/>
+                      <a:tailEnd type="none" w="med" len="med"/>
+                    </a:lnT>
+                    <a:lnB w="12700" cap="flat" cmpd="sng" algn="ctr">
+                      <a:solidFill>
+                        <a:schemeClr val="tx1"/>
+                      </a:solidFill>
+                      <a:prstDash val="solid"/>
+                      <a:round/>
+                      <a:headEnd type="none" w="med" len="med"/>
+                      <a:tailEnd type="none" w="med" len="med"/>
+                    </a:lnB>
+                    <a:lnTlToBr w="12700" cmpd="sng">
+                      <a:noFill/>
+                      <a:prstDash val="solid"/>
+                    </a:lnTlToBr>
+                    <a:lnBlToTr w="12700" cmpd="sng">
+                      <a:noFill/>
+                      <a:prstDash val="solid"/>
+                    </a:lnBlToTr>
+                    <a:noFill/>
+                  </a:tcPr>
+                </a:tc>
+                <a:tc>
+                  <a:txBody>
+                    <a:bodyPr/>
+                    <a:lstStyle/>
+                    <a:p>
+                      <a:pPr algn="l"/>
+                      <a:r>
+                        <a:rPr lang="en-HU" sz="1600" dirty="0">
+                          <a:effectLst/>
+                        </a:rPr>
+                        <a:t>Easy to detect</a:t>
+                      </a:r>
+                    </a:p>
+                  </a:txBody>
+                  <a:tcPr anchor="ctr">
+                    <a:lnL w="12700" cap="flat" cmpd="sng" algn="ctr">
+                      <a:solidFill>
+                        <a:schemeClr val="tx1"/>
+                      </a:solidFill>
+                      <a:prstDash val="solid"/>
+                      <a:round/>
+                      <a:headEnd type="none" w="med" len="med"/>
+                      <a:tailEnd type="none" w="med" len="med"/>
+                    </a:lnL>
+                    <a:lnR w="12700" cap="flat" cmpd="sng" algn="ctr">
+                      <a:solidFill>
+                        <a:schemeClr val="tx1"/>
+                      </a:solidFill>
+                      <a:prstDash val="solid"/>
+                      <a:round/>
+                      <a:headEnd type="none" w="med" len="med"/>
+                      <a:tailEnd type="none" w="med" len="med"/>
+                    </a:lnR>
+                    <a:lnT w="12700" cap="flat" cmpd="sng" algn="ctr">
+                      <a:solidFill>
+                        <a:schemeClr val="tx1"/>
+                      </a:solidFill>
+                      <a:prstDash val="solid"/>
+                      <a:round/>
+                      <a:headEnd type="none" w="med" len="med"/>
+                      <a:tailEnd type="none" w="med" len="med"/>
+                    </a:lnT>
+                    <a:lnB w="12700" cap="flat" cmpd="sng" algn="ctr">
+                      <a:solidFill>
+                        <a:schemeClr val="tx1"/>
+                      </a:solidFill>
+                      <a:prstDash val="solid"/>
+                      <a:round/>
+                      <a:headEnd type="none" w="med" len="med"/>
+                      <a:tailEnd type="none" w="med" len="med"/>
+                    </a:lnB>
+                    <a:lnTlToBr w="12700" cmpd="sng">
+                      <a:noFill/>
+                      <a:prstDash val="solid"/>
+                    </a:lnTlToBr>
+                    <a:lnBlToTr w="12700" cmpd="sng">
+                      <a:noFill/>
+                      <a:prstDash val="solid"/>
+                    </a:lnBlToTr>
+                    <a:noFill/>
+                  </a:tcPr>
+                </a:tc>
+                <a:tc>
+                  <a:txBody>
+                    <a:bodyPr/>
+                    <a:lstStyle/>
+                    <a:p>
+                      <a:pPr algn="l"/>
+                      <a:r>
+                        <a:rPr lang="en-HU" sz="1600" dirty="0">
+                          <a:effectLst/>
+                        </a:rPr>
+                        <a:t>Needs a lot of injected data to cause mass disruption</a:t>
+                      </a:r>
+                    </a:p>
+                  </a:txBody>
+                  <a:tcPr anchor="ctr">
+                    <a:lnL w="12700" cap="flat" cmpd="sng" algn="ctr">
+                      <a:solidFill>
+                        <a:schemeClr val="tx1"/>
+                      </a:solidFill>
+                      <a:prstDash val="solid"/>
+                      <a:round/>
+                      <a:headEnd type="none" w="med" len="med"/>
+                      <a:tailEnd type="none" w="med" len="med"/>
+                    </a:lnL>
+                    <a:lnR w="12700" cap="flat" cmpd="sng" algn="ctr">
+                      <a:solidFill>
+                        <a:schemeClr val="tx1"/>
+                      </a:solidFill>
+                      <a:prstDash val="solid"/>
+                      <a:round/>
+                      <a:headEnd type="none" w="med" len="med"/>
+                      <a:tailEnd type="none" w="med" len="med"/>
+                    </a:lnR>
+                    <a:lnT w="12700" cap="flat" cmpd="sng" algn="ctr">
+                      <a:solidFill>
+                        <a:schemeClr val="tx1"/>
+                      </a:solidFill>
+                      <a:prstDash val="solid"/>
+                      <a:round/>
+                      <a:headEnd type="none" w="med" len="med"/>
+                      <a:tailEnd type="none" w="med" len="med"/>
+                    </a:lnT>
+                    <a:lnB w="12700" cap="flat" cmpd="sng" algn="ctr">
+                      <a:solidFill>
+                        <a:schemeClr val="tx1"/>
+                      </a:solidFill>
+                      <a:prstDash val="solid"/>
+                      <a:round/>
+                      <a:headEnd type="none" w="med" len="med"/>
+                      <a:tailEnd type="none" w="med" len="med"/>
+                    </a:lnB>
+                    <a:lnTlToBr w="12700" cmpd="sng">
+                      <a:noFill/>
+                      <a:prstDash val="solid"/>
+                    </a:lnTlToBr>
+                    <a:lnBlToTr w="12700" cmpd="sng">
+                      <a:noFill/>
+                      <a:prstDash val="solid"/>
+                    </a:lnBlToTr>
+                    <a:noFill/>
+                  </a:tcPr>
+                </a:tc>
+                <a:tc>
+                  <a:txBody>
+                    <a:bodyPr/>
+                    <a:lstStyle/>
+                    <a:p>
+                      <a:pPr algn="l"/>
+                      <a:r>
+                        <a:rPr lang="en-HU" sz="1600" dirty="0">
+                          <a:effectLst/>
+                        </a:rPr>
+                        <a:t>Has no effect in purely unsupervised settings</a:t>
+                      </a:r>
+                    </a:p>
+                  </a:txBody>
+                  <a:tcPr anchor="ctr">
+                    <a:lnL w="12700" cap="flat" cmpd="sng" algn="ctr">
+                      <a:solidFill>
+                        <a:schemeClr val="tx1"/>
+                      </a:solidFill>
+                      <a:prstDash val="solid"/>
+                      <a:round/>
+                      <a:headEnd type="none" w="med" len="med"/>
+                      <a:tailEnd type="none" w="med" len="med"/>
+                    </a:lnL>
+                    <a:lnR w="12700" cap="flat" cmpd="sng" algn="ctr">
+                      <a:solidFill>
+                        <a:schemeClr val="tx1"/>
+                      </a:solidFill>
+                      <a:prstDash val="solid"/>
+                      <a:round/>
+                      <a:headEnd type="none" w="med" len="med"/>
+                      <a:tailEnd type="none" w="med" len="med"/>
+                    </a:lnR>
+                    <a:lnT w="12700" cap="flat" cmpd="sng" algn="ctr">
+                      <a:solidFill>
+                        <a:schemeClr val="tx1"/>
+                      </a:solidFill>
+                      <a:prstDash val="solid"/>
+                      <a:round/>
+                      <a:headEnd type="none" w="med" len="med"/>
+                      <a:tailEnd type="none" w="med" len="med"/>
+                    </a:lnT>
+                    <a:lnB w="12700" cap="flat" cmpd="sng" algn="ctr">
+                      <a:solidFill>
+                        <a:schemeClr val="tx1"/>
+                      </a:solidFill>
+                      <a:prstDash val="solid"/>
+                      <a:round/>
+                      <a:headEnd type="none" w="med" len="med"/>
+                      <a:tailEnd type="none" w="med" len="med"/>
+                    </a:lnB>
+                    <a:lnTlToBr w="12700" cmpd="sng">
+                      <a:noFill/>
+                      <a:prstDash val="solid"/>
+                    </a:lnTlToBr>
+                    <a:lnBlToTr w="12700" cmpd="sng">
+                      <a:noFill/>
+                      <a:prstDash val="solid"/>
+                    </a:lnBlToTr>
+                    <a:noFill/>
+                  </a:tcPr>
+                </a:tc>
+                <a:extLst>
+                  <a:ext uri="{0D108BD9-81ED-4DB2-BD59-A6C34878D82A}">
+                    <a16:rowId xmlns:a16="http://schemas.microsoft.com/office/drawing/2014/main" val="1926496772"/>
+                  </a:ext>
+                </a:extLst>
+              </a:tr>
+            </a:tbl>
+          </a:graphicData>
+        </a:graphic>
+      </p:graphicFrame>
+      <p:sp>
+        <p:nvSpPr>
+          <p:cNvPr id="5" name="Rectangle 1">
+            <a:extLst>
+              <a:ext uri="{FF2B5EF4-FFF2-40B4-BE49-F238E27FC236}">
+                <a16:creationId xmlns:a16="http://schemas.microsoft.com/office/drawing/2014/main" id="{FBF416D1-772A-10B7-941A-A68BD8BC9037}"/>
+              </a:ext>
+            </a:extLst>
+          </p:cNvPr>
+          <p:cNvSpPr>
+            <a:spLocks noChangeArrowheads="1"/>
+          </p:cNvSpPr>
+          <p:nvPr/>
+        </p:nvSpPr>
+        <p:spPr bwMode="auto">
+          <a:xfrm>
+            <a:off x="1040423" y="3131650"/>
+            <a:ext cx="12192000" cy="0"/>
+          </a:xfrm>
+          <a:prstGeom prst="rect">
+            <a:avLst/>
+          </a:prstGeom>
+          <a:noFill/>
+          <a:ln>
+            <a:noFill/>
+          </a:ln>
+          <a:effectLst/>
+          <a:extLst>
+            <a:ext uri="{909E8E84-426E-40DD-AFC4-6F175D3DCCD1}">
+              <a14:hiddenFill xmlns:a14="http://schemas.microsoft.com/office/drawing/2010/main">
+                <a:solidFill>
+                  <a:schemeClr val="accent1"/>
+                </a:solidFill>
+              </a14:hiddenFill>
+            </a:ext>
+            <a:ext uri="{91240B29-F687-4F45-9708-019B960494DF}">
+              <a14:hiddenLine xmlns:a14="http://schemas.microsoft.com/office/drawing/2010/main" w="9525">
+                <a:solidFill>
+                  <a:schemeClr val="tx1"/>
+                </a:solidFill>
+                <a:miter lim="800000"/>
+                <a:headEnd/>
+                <a:tailEnd/>
+              </a14:hiddenLine>
+            </a:ext>
+            <a:ext uri="{AF507438-7753-43E0-B8FC-AC1667EBCBE1}">
+              <a14:hiddenEffects xmlns:a14="http://schemas.microsoft.com/office/drawing/2010/main">
+                <a:effectLst>
+                  <a:outerShdw dist="35921" dir="2700000" algn="ctr" rotWithShape="0">
+                    <a:schemeClr val="bg2"/>
+                  </a:outerShdw>
+                </a:effectLst>
+              </a14:hiddenEffects>
+            </a:ext>
+          </a:extLst>
+        </p:spPr>
+        <p:txBody>
+          <a:bodyPr vert="horz" wrap="none" lIns="91440" tIns="45720" rIns="91440" bIns="45720" numCol="1" anchor="ctr" anchorCtr="0" compatLnSpc="1">
+            <a:prstTxWarp prst="textNoShape">
+              <a:avLst/>
+            </a:prstTxWarp>
+            <a:spAutoFit/>
+          </a:bodyPr>
+          <a:lstStyle/>
+          <a:p>
+            <a:pPr marL="0" marR="0" lvl="0" indent="0" algn="l" defTabSz="914400" rtl="0" eaLnBrk="0" fontAlgn="base" latinLnBrk="0" hangingPunct="0">
+              <a:lnSpc>
+                <a:spcPct val="100000"/>
+              </a:lnSpc>
+              <a:spcBef>
+                <a:spcPct val="0"/>
+              </a:spcBef>
+              <a:spcAft>
+                <a:spcPct val="0"/>
+              </a:spcAft>
+              <a:buClrTx/>
+              <a:buSzTx/>
+              <a:buFontTx/>
+              <a:buNone/>
+              <a:tabLst/>
+            </a:pPr>
+            <a:br>
+              <a:rPr kumimoji="0" lang="en-HU" altLang="en-HU" sz="1800" b="0" i="0" u="none" strike="noStrike" cap="none" normalizeH="0" baseline="0">
+                <a:ln>
+                  <a:noFill/>
+                </a:ln>
+                <a:solidFill>
+                  <a:schemeClr val="tx1"/>
+                </a:solidFill>
+                <a:effectLst/>
+                <a:latin typeface="Arial" panose="020B0604020202020204" pitchFamily="34" charset="0"/>
+              </a:rPr>
+            </a:br>
+            <a:endParaRPr kumimoji="0" lang="en-HU" altLang="en-HU" sz="1800" b="0" i="0" u="none" strike="noStrike" cap="none" normalizeH="0" baseline="0">
+              <a:ln>
+                <a:noFill/>
+              </a:ln>
+              <a:solidFill>
+                <a:schemeClr val="tx1"/>
+              </a:solidFill>
+              <a:effectLst/>
+              <a:latin typeface="Arial" panose="020B0604020202020204" pitchFamily="34" charset="0"/>
+            </a:endParaRPr>
+          </a:p>
+        </p:txBody>
+      </p:sp>
+    </p:spTree>
+    <p:extLst>
+      <p:ext uri="{BB962C8B-B14F-4D97-AF65-F5344CB8AC3E}">
+        <p14:creationId xmlns:p14="http://schemas.microsoft.com/office/powerpoint/2010/main" val="913800206"/>
+      </p:ext>
+    </p:extLst>
+  </p:cSld>
+  <p:clrMapOvr>
+    <a:masterClrMapping/>
+  </p:clrMapOvr>
+</p:sld>
+</file>
+
+<file path=ppt/slides/slide7.xml><?xml version="1.0" encoding="utf-8"?>
 <p:sld xmlns:a="http://schemas.openxmlformats.org/drawingml/2006/main" xmlns:r="http://schemas.openxmlformats.org/officeDocument/2006/relationships" xmlns:p="http://schemas.openxmlformats.org/presentationml/2006/main">
   <p:cSld>
     <p:spTree>

</xml_diff>

<commit_message>
chg: added autoencoder based outlier injection into presentation
</commit_message>
<xml_diff>
--- a/poison_cluster_defense.pptx
+++ b/poison_cluster_defense.pptx
@@ -266,7 +266,7 @@
           <a:p>
             <a:fld id="{C8771E59-BB6D-9C41-A61C-2D524682E115}" type="datetimeFigureOut">
               <a:rPr lang="hu-HU" smtClean="0"/>
-              <a:t>2025. 05. 03.</a:t>
+              <a:t>2025. 05. 04.</a:t>
             </a:fld>
             <a:endParaRPr lang="hu-HU"/>
           </a:p>
@@ -443,7 +443,7 @@
           <a:p>
             <a:fld id="{B4DA393B-998D-3C45-ACA4-5C51E3A83922}" type="datetimeFigureOut">
               <a:rPr lang="hu-HU" smtClean="0"/>
-              <a:t>2025. 05. 03.</a:t>
+              <a:t>2025. 05. 04.</a:t>
             </a:fld>
             <a:endParaRPr lang="hu-HU"/>
           </a:p>
@@ -9303,14 +9303,22 @@
           <a:p>
             <a:r>
               <a:rPr lang="en-GB" dirty="0"/>
-              <a:t>Subtle outliers</a:t>
+              <a:t>Subtle Outliers</a:t>
             </a:r>
           </a:p>
           <a:p>
             <a:r>
               <a:rPr lang="en-GB" dirty="0"/>
-              <a:t>Shuffled labels</a:t>
-            </a:r>
+              <a:t>Shuffled Labels</a:t>
+            </a:r>
+          </a:p>
+          <a:p>
+            <a:r>
+              <a:rPr lang="en-GB" dirty="0"/>
+              <a:t>Autoencoder Outliers</a:t>
+            </a:r>
+          </a:p>
+          <a:p>
             <a:endParaRPr lang="en-HU" dirty="0"/>
           </a:p>
         </p:txBody>
@@ -9362,8 +9370,8 @@
         </p:blipFill>
         <p:spPr>
           <a:xfrm>
-            <a:off x="4235384" y="2057400"/>
-            <a:ext cx="2429420" cy="2743200"/>
+            <a:off x="5057740" y="1348227"/>
+            <a:ext cx="1924581" cy="2150382"/>
           </a:xfrm>
           <a:prstGeom prst="rect">
             <a:avLst/>
@@ -9511,6 +9519,36 @@
           </p:spPr>
         </p:pic>
       </p:grpSp>
+      <p:pic>
+        <p:nvPicPr>
+          <p:cNvPr id="5" name="Kép 4" descr="A képen szöveg, képernyőkép, diagram, Betűtípus látható&#10;&#10;Előfordulhat, hogy a mesterséges intelligencia által létrehozott tartalom helytelen.">
+            <a:extLst>
+              <a:ext uri="{FF2B5EF4-FFF2-40B4-BE49-F238E27FC236}">
+                <a16:creationId xmlns:a16="http://schemas.microsoft.com/office/drawing/2014/main" id="{1B895F2B-8FA8-681E-FCF0-D586B16C8695}"/>
+              </a:ext>
+            </a:extLst>
+          </p:cNvPr>
+          <p:cNvPicPr>
+            <a:picLocks noChangeAspect="1"/>
+          </p:cNvPicPr>
+          <p:nvPr/>
+        </p:nvPicPr>
+        <p:blipFill>
+          <a:blip r:embed="rId7"/>
+          <a:stretch>
+            <a:fillRect/>
+          </a:stretch>
+        </p:blipFill>
+        <p:spPr>
+          <a:xfrm>
+            <a:off x="5055038" y="3513795"/>
+            <a:ext cx="1878893" cy="2285406"/>
+          </a:xfrm>
+          <a:prstGeom prst="rect">
+            <a:avLst/>
+          </a:prstGeom>
+        </p:spPr>
+      </p:pic>
     </p:spTree>
     <p:extLst>
       <p:ext uri="{BB962C8B-B14F-4D97-AF65-F5344CB8AC3E}">
@@ -9616,52 +9654,59 @@
           <p:nvPr>
             <p:extLst>
               <p:ext uri="{D42A27DB-BD31-4B8C-83A1-F6EECF244321}">
-                <p14:modId xmlns:p14="http://schemas.microsoft.com/office/powerpoint/2010/main" val="2138934877"/>
+                <p14:modId xmlns:p14="http://schemas.microsoft.com/office/powerpoint/2010/main" val="1869205516"/>
               </p:ext>
             </p:extLst>
           </p:nvPr>
         </p:nvGraphicFramePr>
         <p:xfrm>
           <a:off x="838200" y="1830485"/>
-          <a:ext cx="10515600" cy="3480067"/>
+          <a:ext cx="10515600" cy="3597916"/>
         </p:xfrm>
         <a:graphic>
           <a:graphicData uri="http://schemas.openxmlformats.org/drawingml/2006/table">
             <a:tbl>
               <a:tblPr/>
               <a:tblGrid>
-                <a:gridCol w="808164">
+                <a:gridCol w="673470">
                   <a:extLst>
                     <a:ext uri="{9D8B030D-6E8A-4147-A177-3AD203B41FA5}">
                       <a16:colId xmlns:a16="http://schemas.microsoft.com/office/drawing/2014/main" val="3580539963"/>
                     </a:ext>
                   </a:extLst>
                 </a:gridCol>
-                <a:gridCol w="3398076">
+                <a:gridCol w="2831730">
                   <a:extLst>
                     <a:ext uri="{9D8B030D-6E8A-4147-A177-3AD203B41FA5}">
                       <a16:colId xmlns:a16="http://schemas.microsoft.com/office/drawing/2014/main" val="1752262900"/>
                     </a:ext>
                   </a:extLst>
                 </a:gridCol>
-                <a:gridCol w="2103120">
+                <a:gridCol w="1752600">
                   <a:extLst>
                     <a:ext uri="{9D8B030D-6E8A-4147-A177-3AD203B41FA5}">
                       <a16:colId xmlns:a16="http://schemas.microsoft.com/office/drawing/2014/main" val="808131755"/>
                     </a:ext>
                   </a:extLst>
                 </a:gridCol>
-                <a:gridCol w="2103120">
+                <a:gridCol w="1752600">
                   <a:extLst>
                     <a:ext uri="{9D8B030D-6E8A-4147-A177-3AD203B41FA5}">
                       <a16:colId xmlns:a16="http://schemas.microsoft.com/office/drawing/2014/main" val="641345387"/>
                     </a:ext>
                   </a:extLst>
                 </a:gridCol>
-                <a:gridCol w="2103120">
+                <a:gridCol w="1752600">
                   <a:extLst>
                     <a:ext uri="{9D8B030D-6E8A-4147-A177-3AD203B41FA5}">
                       <a16:colId xmlns:a16="http://schemas.microsoft.com/office/drawing/2014/main" val="1528192510"/>
+                    </a:ext>
+                  </a:extLst>
+                </a:gridCol>
+                <a:gridCol w="1752600">
+                  <a:extLst>
+                    <a:ext uri="{9D8B030D-6E8A-4147-A177-3AD203B41FA5}">
+                      <a16:colId xmlns:a16="http://schemas.microsoft.com/office/drawing/2014/main" val="3560467826"/>
                     </a:ext>
                   </a:extLst>
                 </a:gridCol>
@@ -9930,6 +9975,66 @@
                         <a:t>Shuffled</a:t>
                       </a:r>
                       <a:endParaRPr lang="en-HU" sz="1600" dirty="0"/>
+                    </a:p>
+                  </a:txBody>
+                  <a:tcPr anchor="ctr">
+                    <a:lnL w="12700" cap="flat" cmpd="sng" algn="ctr">
+                      <a:solidFill>
+                        <a:schemeClr val="tx1"/>
+                      </a:solidFill>
+                      <a:prstDash val="solid"/>
+                      <a:round/>
+                      <a:headEnd type="none" w="med" len="med"/>
+                      <a:tailEnd type="none" w="med" len="med"/>
+                    </a:lnL>
+                    <a:lnR w="12700" cap="flat" cmpd="sng" algn="ctr">
+                      <a:solidFill>
+                        <a:schemeClr val="tx1"/>
+                      </a:solidFill>
+                      <a:prstDash val="solid"/>
+                      <a:round/>
+                      <a:headEnd type="none" w="med" len="med"/>
+                      <a:tailEnd type="none" w="med" len="med"/>
+                    </a:lnR>
+                    <a:lnT w="12700" cap="flat" cmpd="sng" algn="ctr">
+                      <a:solidFill>
+                        <a:schemeClr val="tx1"/>
+                      </a:solidFill>
+                      <a:prstDash val="solid"/>
+                      <a:round/>
+                      <a:headEnd type="none" w="med" len="med"/>
+                      <a:tailEnd type="none" w="med" len="med"/>
+                    </a:lnT>
+                    <a:lnB w="12700" cap="flat" cmpd="sng" algn="ctr">
+                      <a:solidFill>
+                        <a:schemeClr val="tx1"/>
+                      </a:solidFill>
+                      <a:prstDash val="solid"/>
+                      <a:round/>
+                      <a:headEnd type="none" w="med" len="med"/>
+                      <a:tailEnd type="none" w="med" len="med"/>
+                    </a:lnB>
+                    <a:lnTlToBr w="12700" cmpd="sng">
+                      <a:noFill/>
+                      <a:prstDash val="solid"/>
+                    </a:lnTlToBr>
+                    <a:lnBlToTr w="12700" cmpd="sng">
+                      <a:noFill/>
+                      <a:prstDash val="solid"/>
+                    </a:lnBlToTr>
+                  </a:tcPr>
+                </a:tc>
+                <a:tc>
+                  <a:txBody>
+                    <a:bodyPr/>
+                    <a:lstStyle/>
+                    <a:p>
+                      <a:pPr algn="l"/>
+                      <a:r>
+                        <a:rPr lang="en-US" sz="1600" b="1" dirty="0"/>
+                        <a:t>Model</a:t>
+                      </a:r>
+                      <a:endParaRPr lang="en-HU" sz="1600" b="1" dirty="0"/>
                     </a:p>
                   </a:txBody>
                   <a:tcPr anchor="ctr">
@@ -10320,6 +10425,71 @@
                     <a:noFill/>
                   </a:tcPr>
                 </a:tc>
+                <a:tc>
+                  <a:txBody>
+                    <a:bodyPr/>
+                    <a:lstStyle/>
+                    <a:p>
+                      <a:pPr algn="l"/>
+                      <a:r>
+                        <a:rPr lang="en-US" sz="1600" dirty="0">
+                          <a:effectLst/>
+                        </a:rPr>
+                        <a:t>Based on training goals can be hard to detect or it can create extreme values</a:t>
+                      </a:r>
+                      <a:endParaRPr lang="en-HU" sz="1600" dirty="0">
+                        <a:effectLst/>
+                      </a:endParaRPr>
+                    </a:p>
+                  </a:txBody>
+                  <a:tcPr anchor="ctr">
+                    <a:lnL w="12700" cap="flat" cmpd="sng" algn="ctr">
+                      <a:solidFill>
+                        <a:schemeClr val="tx1"/>
+                      </a:solidFill>
+                      <a:prstDash val="solid"/>
+                      <a:round/>
+                      <a:headEnd type="none" w="med" len="med"/>
+                      <a:tailEnd type="none" w="med" len="med"/>
+                    </a:lnL>
+                    <a:lnR w="12700" cap="flat" cmpd="sng" algn="ctr">
+                      <a:solidFill>
+                        <a:schemeClr val="tx1"/>
+                      </a:solidFill>
+                      <a:prstDash val="solid"/>
+                      <a:round/>
+                      <a:headEnd type="none" w="med" len="med"/>
+                      <a:tailEnd type="none" w="med" len="med"/>
+                    </a:lnR>
+                    <a:lnT w="12700" cap="flat" cmpd="sng" algn="ctr">
+                      <a:solidFill>
+                        <a:schemeClr val="tx1"/>
+                      </a:solidFill>
+                      <a:prstDash val="solid"/>
+                      <a:round/>
+                      <a:headEnd type="none" w="med" len="med"/>
+                      <a:tailEnd type="none" w="med" len="med"/>
+                    </a:lnT>
+                    <a:lnB w="12700" cap="flat" cmpd="sng" algn="ctr">
+                      <a:solidFill>
+                        <a:schemeClr val="tx1"/>
+                      </a:solidFill>
+                      <a:prstDash val="solid"/>
+                      <a:round/>
+                      <a:headEnd type="none" w="med" len="med"/>
+                      <a:tailEnd type="none" w="med" len="med"/>
+                    </a:lnB>
+                    <a:lnTlToBr w="12700" cmpd="sng">
+                      <a:noFill/>
+                      <a:prstDash val="solid"/>
+                    </a:lnTlToBr>
+                    <a:lnBlToTr w="12700" cmpd="sng">
+                      <a:noFill/>
+                      <a:prstDash val="solid"/>
+                    </a:lnBlToTr>
+                    <a:noFill/>
+                  </a:tcPr>
+                </a:tc>
                 <a:extLst>
                   <a:ext uri="{0D108BD9-81ED-4DB2-BD59-A6C34878D82A}">
                     <a16:rowId xmlns:a16="http://schemas.microsoft.com/office/drawing/2014/main" val="3828876444"/>
@@ -10587,6 +10757,71 @@
                         </a:rPr>
                         <a:t>Has no effect in purely unsupervised settings</a:t>
                       </a:r>
+                    </a:p>
+                  </a:txBody>
+                  <a:tcPr anchor="ctr">
+                    <a:lnL w="12700" cap="flat" cmpd="sng" algn="ctr">
+                      <a:solidFill>
+                        <a:schemeClr val="tx1"/>
+                      </a:solidFill>
+                      <a:prstDash val="solid"/>
+                      <a:round/>
+                      <a:headEnd type="none" w="med" len="med"/>
+                      <a:tailEnd type="none" w="med" len="med"/>
+                    </a:lnL>
+                    <a:lnR w="12700" cap="flat" cmpd="sng" algn="ctr">
+                      <a:solidFill>
+                        <a:schemeClr val="tx1"/>
+                      </a:solidFill>
+                      <a:prstDash val="solid"/>
+                      <a:round/>
+                      <a:headEnd type="none" w="med" len="med"/>
+                      <a:tailEnd type="none" w="med" len="med"/>
+                    </a:lnR>
+                    <a:lnT w="12700" cap="flat" cmpd="sng" algn="ctr">
+                      <a:solidFill>
+                        <a:schemeClr val="tx1"/>
+                      </a:solidFill>
+                      <a:prstDash val="solid"/>
+                      <a:round/>
+                      <a:headEnd type="none" w="med" len="med"/>
+                      <a:tailEnd type="none" w="med" len="med"/>
+                    </a:lnT>
+                    <a:lnB w="12700" cap="flat" cmpd="sng" algn="ctr">
+                      <a:solidFill>
+                        <a:schemeClr val="tx1"/>
+                      </a:solidFill>
+                      <a:prstDash val="solid"/>
+                      <a:round/>
+                      <a:headEnd type="none" w="med" len="med"/>
+                      <a:tailEnd type="none" w="med" len="med"/>
+                    </a:lnB>
+                    <a:lnTlToBr w="12700" cmpd="sng">
+                      <a:noFill/>
+                      <a:prstDash val="solid"/>
+                    </a:lnTlToBr>
+                    <a:lnBlToTr w="12700" cmpd="sng">
+                      <a:noFill/>
+                      <a:prstDash val="solid"/>
+                    </a:lnBlToTr>
+                    <a:noFill/>
+                  </a:tcPr>
+                </a:tc>
+                <a:tc>
+                  <a:txBody>
+                    <a:bodyPr/>
+                    <a:lstStyle/>
+                    <a:p>
+                      <a:pPr algn="l"/>
+                      <a:r>
+                        <a:rPr lang="en-US" sz="1600" dirty="0">
+                          <a:effectLst/>
+                        </a:rPr>
+                        <a:t>The model needs finetuning on the dataset</a:t>
+                      </a:r>
+                      <a:endParaRPr lang="en-HU" sz="1600" dirty="0">
+                        <a:effectLst/>
+                      </a:endParaRPr>
                     </a:p>
                   </a:txBody>
                   <a:tcPr anchor="ctr">

</xml_diff>